<commit_message>
Prepare for new ppt
</commit_message>
<xml_diff>
--- a/15061084-冯聪-爱厨艺亲子主题餐饮.pptx
+++ b/15061084-冯聪-爱厨艺亲子主题餐饮.pptx
@@ -5,20 +5,20 @@
     <p:sldMasterId id="2147483648" r:id="rId1"/>
   </p:sldMasterIdLst>
   <p:notesMasterIdLst>
-    <p:notesMasterId r:id="rId14"/>
+    <p:notesMasterId r:id="rId4"/>
   </p:notesMasterIdLst>
   <p:sldIdLst>
     <p:sldId id="256" r:id="rId3"/>
-    <p:sldId id="261" r:id="rId4"/>
-    <p:sldId id="258" r:id="rId5"/>
-    <p:sldId id="264" r:id="rId6"/>
-    <p:sldId id="265" r:id="rId7"/>
-    <p:sldId id="260" r:id="rId8"/>
-    <p:sldId id="257" r:id="rId9"/>
-    <p:sldId id="266" r:id="rId10"/>
-    <p:sldId id="267" r:id="rId11"/>
-    <p:sldId id="263" r:id="rId12"/>
-    <p:sldId id="268" r:id="rId13"/>
+    <p:sldId id="261" r:id="rId5"/>
+    <p:sldId id="258" r:id="rId6"/>
+    <p:sldId id="264" r:id="rId7"/>
+    <p:sldId id="265" r:id="rId8"/>
+    <p:sldId id="260" r:id="rId9"/>
+    <p:sldId id="257" r:id="rId10"/>
+    <p:sldId id="266" r:id="rId11"/>
+    <p:sldId id="267" r:id="rId12"/>
+    <p:sldId id="263" r:id="rId13"/>
+    <p:sldId id="268" r:id="rId14"/>
   </p:sldIdLst>
   <p:sldSz cx="12192000" cy="6858000"/>
   <p:notesSz cx="6858000" cy="9144000"/>
@@ -465,6 +465,71 @@
     </a:lvl9pPr>
   </p:notesStyle>
 </p:notesMaster>
+</file>
+
+<file path=ppt/notesSlides/notesSlide1.xml><?xml version="1.0" encoding="utf-8"?>
+<p:notes xmlns:a="http://schemas.openxmlformats.org/drawingml/2006/main" xmlns:r="http://schemas.openxmlformats.org/officeDocument/2006/relationships" xmlns:p="http://schemas.openxmlformats.org/presentationml/2006/main">
+  <p:cSld>
+    <p:spTree>
+      <p:nvGrpSpPr>
+        <p:cNvPr id="1" name=""/>
+        <p:cNvGrpSpPr/>
+        <p:nvPr/>
+      </p:nvGrpSpPr>
+      <p:grpSpPr/>
+      <p:sp>
+        <p:nvSpPr>
+          <p:cNvPr id="2" name="Slide Image Placeholder 1"/>
+          <p:cNvSpPr/>
+          <p:nvPr>
+            <p:ph type="sldImg" idx="2"/>
+          </p:nvPr>
+        </p:nvSpPr>
+        <p:spPr/>
+      </p:sp>
+      <p:sp>
+        <p:nvSpPr>
+          <p:cNvPr id="3" name="Text Placeholder 2"/>
+          <p:cNvSpPr/>
+          <p:nvPr>
+            <p:ph type="body" idx="3"/>
+          </p:nvPr>
+        </p:nvSpPr>
+        <p:spPr/>
+        <p:txBody>
+          <a:bodyPr/>
+          <a:p>
+            <a:endParaRPr lang="en-US"/>
+          </a:p>
+        </p:txBody>
+      </p:sp>
+      <p:sp>
+        <p:nvSpPr>
+          <p:cNvPr id="4" name="Slide Number Placeholder 3"/>
+          <p:cNvSpPr>
+            <a:spLocks noGrp="1"/>
+          </p:cNvSpPr>
+          <p:nvPr>
+            <p:ph type="sldNum" sz="quarter" idx="5"/>
+          </p:nvPr>
+        </p:nvSpPr>
+        <p:spPr/>
+        <p:txBody>
+          <a:bodyPr/>
+          <a:p>
+            <a:fld id="{21B2AA4F-B828-4D7C-AFD3-893933DAFCB4}" type="slidenum">
+              <a:rPr lang="en-US" smtClean="0"/>
+            </a:fld>
+            <a:endParaRPr lang="en-US"/>
+          </a:p>
+        </p:txBody>
+      </p:sp>
+    </p:spTree>
+  </p:cSld>
+  <p:clrMapOvr>
+    <a:masterClrMapping/>
+  </p:clrMapOvr>
+</p:notes>
 </file>
 
 <file path=ppt/slideLayouts/slideLayout1.xml><?xml version="1.0" encoding="utf-8"?>
@@ -3189,7 +3254,7 @@
         <a:spcAft>
           <a:spcPct val="0"/>
         </a:spcAft>
-        <a:buFont typeface="Arial" panose="02080604020202020204" charset="0"/>
+        <a:buFont typeface="Arial" charset="0"/>
         <a:buNone/>
         <a:defRPr sz="1800" b="0" i="0" u="none" kern="1200" baseline="0">
           <a:solidFill>
@@ -3210,7 +3275,7 @@
         <a:spcAft>
           <a:spcPct val="0"/>
         </a:spcAft>
-        <a:buFont typeface="Arial" panose="02080604020202020204" charset="0"/>
+        <a:buFont typeface="Arial" charset="0"/>
         <a:buNone/>
         <a:defRPr sz="1800" b="0" i="0" u="none" kern="1200" baseline="0">
           <a:solidFill>
@@ -3231,7 +3296,7 @@
         <a:spcAft>
           <a:spcPct val="0"/>
         </a:spcAft>
-        <a:buFont typeface="Arial" panose="02080604020202020204" charset="0"/>
+        <a:buFont typeface="Arial" charset="0"/>
         <a:buNone/>
         <a:defRPr sz="1800" b="0" i="0" u="none" kern="1200" baseline="0">
           <a:solidFill>
@@ -3252,7 +3317,7 @@
         <a:spcAft>
           <a:spcPct val="0"/>
         </a:spcAft>
-        <a:buFont typeface="Arial" panose="02080604020202020204" charset="0"/>
+        <a:buFont typeface="Arial" charset="0"/>
         <a:buNone/>
         <a:defRPr sz="1800" b="0" i="0" u="none" kern="1200" baseline="0">
           <a:solidFill>
@@ -3273,7 +3338,7 @@
         <a:spcAft>
           <a:spcPct val="0"/>
         </a:spcAft>
-        <a:buFont typeface="Arial" panose="02080604020202020204" charset="0"/>
+        <a:buFont typeface="Arial" charset="0"/>
         <a:buNone/>
         <a:defRPr sz="1800" b="0" i="0" u="none" kern="1200" baseline="0">
           <a:solidFill>
@@ -3294,7 +3359,7 @@
         <a:spcAft>
           <a:spcPct val="0"/>
         </a:spcAft>
-        <a:buFont typeface="Arial" panose="02080604020202020204" charset="0"/>
+        <a:buFont typeface="Arial" charset="0"/>
         <a:buNone/>
         <a:defRPr sz="1800" b="0" i="0" u="none" kern="1200" baseline="0">
           <a:solidFill>
@@ -3315,7 +3380,7 @@
         <a:spcAft>
           <a:spcPct val="0"/>
         </a:spcAft>
-        <a:buFont typeface="Arial" panose="02080604020202020204" charset="0"/>
+        <a:buFont typeface="Arial" charset="0"/>
         <a:buNone/>
         <a:defRPr sz="1800" b="0" i="0" u="none" kern="1200" baseline="0">
           <a:solidFill>
@@ -3336,7 +3401,7 @@
         <a:spcAft>
           <a:spcPct val="0"/>
         </a:spcAft>
-        <a:buFont typeface="Arial" panose="02080604020202020204" charset="0"/>
+        <a:buFont typeface="Arial" charset="0"/>
         <a:buNone/>
         <a:defRPr sz="1800" b="0" i="0" u="none" kern="1200" baseline="0">
           <a:solidFill>
@@ -3357,7 +3422,7 @@
         <a:spcAft>
           <a:spcPct val="0"/>
         </a:spcAft>
-        <a:buFont typeface="Arial" panose="02080604020202020204" charset="0"/>
+        <a:buFont typeface="Arial" charset="0"/>
         <a:buNone/>
         <a:defRPr sz="1800" b="0" i="0" u="none" kern="1200" baseline="0">
           <a:solidFill>

</xml_diff>